<commit_message>
Tried out fourier transforms + tracking
</commit_message>
<xml_diff>
--- a/Tracker/QuasiperiodicKickedRotor.pptx
+++ b/Tracker/QuasiperiodicKickedRotor.pptx
@@ -6,14 +6,17 @@
   </p:sldMasterIdLst>
   <p:sldIdLst>
     <p:sldId id="256" r:id="rId2"/>
-    <p:sldId id="263" r:id="rId3"/>
-    <p:sldId id="258" r:id="rId4"/>
-    <p:sldId id="257" r:id="rId5"/>
-    <p:sldId id="262" r:id="rId6"/>
-    <p:sldId id="259" r:id="rId7"/>
-    <p:sldId id="260" r:id="rId8"/>
-    <p:sldId id="261" r:id="rId9"/>
-    <p:sldId id="264" r:id="rId10"/>
+    <p:sldId id="269" r:id="rId3"/>
+    <p:sldId id="268" r:id="rId4"/>
+    <p:sldId id="266" r:id="rId5"/>
+    <p:sldId id="263" r:id="rId6"/>
+    <p:sldId id="258" r:id="rId7"/>
+    <p:sldId id="257" r:id="rId8"/>
+    <p:sldId id="262" r:id="rId9"/>
+    <p:sldId id="259" r:id="rId10"/>
+    <p:sldId id="260" r:id="rId11"/>
+    <p:sldId id="261" r:id="rId12"/>
+    <p:sldId id="264" r:id="rId13"/>
   </p:sldIdLst>
   <p:sldSz cx="12192000" cy="6858000"/>
   <p:notesSz cx="6858000" cy="9144000"/>
@@ -112,6 +115,11 @@
       </a:defRPr>
     </a:lvl9pPr>
   </p:defaultTextStyle>
+  <p:extLst>
+    <p:ext uri="{EFAFB233-063F-42B5-8137-9DF3F51BA10A}">
+      <p15:sldGuideLst xmlns:p15="http://schemas.microsoft.com/office/powerpoint/2012/main"/>
+    </p:ext>
+  </p:extLst>
 </p:presentation>
 </file>
 
@@ -264,7 +272,7 @@
           <a:p>
             <a:fld id="{B8399866-25F1-463B-BE93-03C39E8C28A8}" type="datetimeFigureOut">
               <a:rPr lang="en-IN" smtClean="0"/>
-              <a:t>17-04-2021</a:t>
+              <a:t>21-04-2021</a:t>
             </a:fld>
             <a:endParaRPr lang="en-IN"/>
           </a:p>
@@ -464,7 +472,7 @@
           <a:p>
             <a:fld id="{B8399866-25F1-463B-BE93-03C39E8C28A8}" type="datetimeFigureOut">
               <a:rPr lang="en-IN" smtClean="0"/>
-              <a:t>17-04-2021</a:t>
+              <a:t>21-04-2021</a:t>
             </a:fld>
             <a:endParaRPr lang="en-IN"/>
           </a:p>
@@ -674,7 +682,7 @@
           <a:p>
             <a:fld id="{B8399866-25F1-463B-BE93-03C39E8C28A8}" type="datetimeFigureOut">
               <a:rPr lang="en-IN" smtClean="0"/>
-              <a:t>17-04-2021</a:t>
+              <a:t>21-04-2021</a:t>
             </a:fld>
             <a:endParaRPr lang="en-IN"/>
           </a:p>
@@ -874,7 +882,7 @@
           <a:p>
             <a:fld id="{B8399866-25F1-463B-BE93-03C39E8C28A8}" type="datetimeFigureOut">
               <a:rPr lang="en-IN" smtClean="0"/>
-              <a:t>17-04-2021</a:t>
+              <a:t>21-04-2021</a:t>
             </a:fld>
             <a:endParaRPr lang="en-IN"/>
           </a:p>
@@ -1150,7 +1158,7 @@
           <a:p>
             <a:fld id="{B8399866-25F1-463B-BE93-03C39E8C28A8}" type="datetimeFigureOut">
               <a:rPr lang="en-IN" smtClean="0"/>
-              <a:t>17-04-2021</a:t>
+              <a:t>21-04-2021</a:t>
             </a:fld>
             <a:endParaRPr lang="en-IN"/>
           </a:p>
@@ -1418,7 +1426,7 @@
           <a:p>
             <a:fld id="{B8399866-25F1-463B-BE93-03C39E8C28A8}" type="datetimeFigureOut">
               <a:rPr lang="en-IN" smtClean="0"/>
-              <a:t>17-04-2021</a:t>
+              <a:t>21-04-2021</a:t>
             </a:fld>
             <a:endParaRPr lang="en-IN"/>
           </a:p>
@@ -1833,7 +1841,7 @@
           <a:p>
             <a:fld id="{B8399866-25F1-463B-BE93-03C39E8C28A8}" type="datetimeFigureOut">
               <a:rPr lang="en-IN" smtClean="0"/>
-              <a:t>17-04-2021</a:t>
+              <a:t>21-04-2021</a:t>
             </a:fld>
             <a:endParaRPr lang="en-IN"/>
           </a:p>
@@ -1975,7 +1983,7 @@
           <a:p>
             <a:fld id="{B8399866-25F1-463B-BE93-03C39E8C28A8}" type="datetimeFigureOut">
               <a:rPr lang="en-IN" smtClean="0"/>
-              <a:t>17-04-2021</a:t>
+              <a:t>21-04-2021</a:t>
             </a:fld>
             <a:endParaRPr lang="en-IN"/>
           </a:p>
@@ -2088,7 +2096,7 @@
           <a:p>
             <a:fld id="{B8399866-25F1-463B-BE93-03C39E8C28A8}" type="datetimeFigureOut">
               <a:rPr lang="en-IN" smtClean="0"/>
-              <a:t>17-04-2021</a:t>
+              <a:t>21-04-2021</a:t>
             </a:fld>
             <a:endParaRPr lang="en-IN"/>
           </a:p>
@@ -2401,7 +2409,7 @@
           <a:p>
             <a:fld id="{B8399866-25F1-463B-BE93-03C39E8C28A8}" type="datetimeFigureOut">
               <a:rPr lang="en-IN" smtClean="0"/>
-              <a:t>17-04-2021</a:t>
+              <a:t>21-04-2021</a:t>
             </a:fld>
             <a:endParaRPr lang="en-IN"/>
           </a:p>
@@ -2690,7 +2698,7 @@
           <a:p>
             <a:fld id="{B8399866-25F1-463B-BE93-03C39E8C28A8}" type="datetimeFigureOut">
               <a:rPr lang="en-IN" smtClean="0"/>
-              <a:t>17-04-2021</a:t>
+              <a:t>21-04-2021</a:t>
             </a:fld>
             <a:endParaRPr lang="en-IN"/>
           </a:p>
@@ -2933,7 +2941,7 @@
           <a:p>
             <a:fld id="{B8399866-25F1-463B-BE93-03C39E8C28A8}" type="datetimeFigureOut">
               <a:rPr lang="en-IN" smtClean="0"/>
-              <a:t>17-04-2021</a:t>
+              <a:t>21-04-2021</a:t>
             </a:fld>
             <a:endParaRPr lang="en-IN"/>
           </a:p>
@@ -3419,6 +3427,406 @@
 </p:sld>
 </file>
 
+<file path=ppt/slides/slide10.xml><?xml version="1.0" encoding="utf-8"?>
+<p:sld xmlns:a="http://schemas.openxmlformats.org/drawingml/2006/main" xmlns:r="http://schemas.openxmlformats.org/officeDocument/2006/relationships" xmlns:p="http://schemas.openxmlformats.org/presentationml/2006/main">
+  <p:cSld>
+    <p:spTree>
+      <p:nvGrpSpPr>
+        <p:cNvPr id="1" name=""/>
+        <p:cNvGrpSpPr/>
+        <p:nvPr/>
+      </p:nvGrpSpPr>
+      <p:grpSpPr>
+        <a:xfrm>
+          <a:off x="0" y="0"/>
+          <a:ext cx="0" cy="0"/>
+          <a:chOff x="0" y="0"/>
+          <a:chExt cx="0" cy="0"/>
+        </a:xfrm>
+      </p:grpSpPr>
+      <p:pic>
+        <p:nvPicPr>
+          <p:cNvPr id="5" name="Content Placeholder 4">
+            <a:extLst>
+              <a:ext uri="{FF2B5EF4-FFF2-40B4-BE49-F238E27FC236}">
+                <a16:creationId xmlns:a16="http://schemas.microsoft.com/office/drawing/2014/main" id="{18E678D0-E5DC-4DB2-B16C-C46FA933E352}"/>
+              </a:ext>
+            </a:extLst>
+          </p:cNvPr>
+          <p:cNvPicPr>
+            <a:picLocks noGrp="1" noChangeAspect="1"/>
+          </p:cNvPicPr>
+          <p:nvPr>
+            <p:ph idx="1"/>
+          </p:nvPr>
+        </p:nvPicPr>
+        <p:blipFill>
+          <a:blip r:embed="rId2">
+            <a:extLst>
+              <a:ext uri="{28A0092B-C50C-407E-A947-70E740481C1C}">
+                <a14:useLocalDpi xmlns:a14="http://schemas.microsoft.com/office/drawing/2010/main" val="0"/>
+              </a:ext>
+            </a:extLst>
+          </a:blip>
+          <a:stretch>
+            <a:fillRect/>
+          </a:stretch>
+        </p:blipFill>
+        <p:spPr>
+          <a:xfrm>
+            <a:off x="-5256" y="1395249"/>
+            <a:ext cx="12202512" cy="4067502"/>
+          </a:xfrm>
+        </p:spPr>
+      </p:pic>
+    </p:spTree>
+    <p:extLst>
+      <p:ext uri="{BB962C8B-B14F-4D97-AF65-F5344CB8AC3E}">
+        <p14:creationId xmlns:p14="http://schemas.microsoft.com/office/powerpoint/2010/main" val="2682917440"/>
+      </p:ext>
+    </p:extLst>
+  </p:cSld>
+  <p:clrMapOvr>
+    <a:masterClrMapping/>
+  </p:clrMapOvr>
+</p:sld>
+</file>
+
+<file path=ppt/slides/slide11.xml><?xml version="1.0" encoding="utf-8"?>
+<p:sld xmlns:a="http://schemas.openxmlformats.org/drawingml/2006/main" xmlns:r="http://schemas.openxmlformats.org/officeDocument/2006/relationships" xmlns:p="http://schemas.openxmlformats.org/presentationml/2006/main">
+  <p:cSld>
+    <p:spTree>
+      <p:nvGrpSpPr>
+        <p:cNvPr id="1" name=""/>
+        <p:cNvGrpSpPr/>
+        <p:nvPr/>
+      </p:nvGrpSpPr>
+      <p:grpSpPr>
+        <a:xfrm>
+          <a:off x="0" y="0"/>
+          <a:ext cx="0" cy="0"/>
+          <a:chOff x="0" y="0"/>
+          <a:chExt cx="0" cy="0"/>
+        </a:xfrm>
+      </p:grpSpPr>
+      <p:pic>
+        <p:nvPicPr>
+          <p:cNvPr id="5" name="Content Placeholder 4">
+            <a:extLst>
+              <a:ext uri="{FF2B5EF4-FFF2-40B4-BE49-F238E27FC236}">
+                <a16:creationId xmlns:a16="http://schemas.microsoft.com/office/drawing/2014/main" id="{2C6E9B32-584A-4A8A-B134-193B209761A7}"/>
+              </a:ext>
+            </a:extLst>
+          </p:cNvPr>
+          <p:cNvPicPr>
+            <a:picLocks noGrp="1" noChangeAspect="1"/>
+          </p:cNvPicPr>
+          <p:nvPr>
+            <p:ph idx="1"/>
+          </p:nvPr>
+        </p:nvPicPr>
+        <p:blipFill>
+          <a:blip r:embed="rId2"/>
+          <a:stretch>
+            <a:fillRect/>
+          </a:stretch>
+        </p:blipFill>
+        <p:spPr>
+          <a:xfrm>
+            <a:off x="2080506" y="0"/>
+            <a:ext cx="8172878" cy="6858000"/>
+          </a:xfrm>
+        </p:spPr>
+      </p:pic>
+    </p:spTree>
+    <p:extLst>
+      <p:ext uri="{BB962C8B-B14F-4D97-AF65-F5344CB8AC3E}">
+        <p14:creationId xmlns:p14="http://schemas.microsoft.com/office/powerpoint/2010/main" val="1440578533"/>
+      </p:ext>
+    </p:extLst>
+  </p:cSld>
+  <p:clrMapOvr>
+    <a:masterClrMapping/>
+  </p:clrMapOvr>
+</p:sld>
+</file>
+
+<file path=ppt/slides/slide12.xml><?xml version="1.0" encoding="utf-8"?>
+<p:sld xmlns:a="http://schemas.openxmlformats.org/drawingml/2006/main" xmlns:r="http://schemas.openxmlformats.org/officeDocument/2006/relationships" xmlns:p="http://schemas.openxmlformats.org/presentationml/2006/main">
+  <p:cSld>
+    <p:spTree>
+      <p:nvGrpSpPr>
+        <p:cNvPr id="1" name=""/>
+        <p:cNvGrpSpPr/>
+        <p:nvPr/>
+      </p:nvGrpSpPr>
+      <p:grpSpPr>
+        <a:xfrm>
+          <a:off x="0" y="0"/>
+          <a:ext cx="0" cy="0"/>
+          <a:chOff x="0" y="0"/>
+          <a:chExt cx="0" cy="0"/>
+        </a:xfrm>
+      </p:grpSpPr>
+      <p:sp>
+        <p:nvSpPr>
+          <p:cNvPr id="3" name="Content Placeholder 2">
+            <a:extLst>
+              <a:ext uri="{FF2B5EF4-FFF2-40B4-BE49-F238E27FC236}">
+                <a16:creationId xmlns:a16="http://schemas.microsoft.com/office/drawing/2014/main" id="{7BF75504-C229-4E31-A956-5FE1963E1457}"/>
+              </a:ext>
+            </a:extLst>
+          </p:cNvPr>
+          <p:cNvSpPr>
+            <a:spLocks noGrp="1"/>
+          </p:cNvSpPr>
+          <p:nvPr>
+            <p:ph idx="1"/>
+          </p:nvPr>
+        </p:nvSpPr>
+        <p:spPr>
+          <a:xfrm>
+            <a:off x="838200" y="1825625"/>
+            <a:ext cx="10515600" cy="1981747"/>
+          </a:xfrm>
+        </p:spPr>
+        <p:txBody>
+          <a:bodyPr>
+            <a:normAutofit/>
+          </a:bodyPr>
+          <a:lstStyle/>
+          <a:p>
+            <a:pPr marL="0" indent="0">
+              <a:lnSpc>
+                <a:spcPct val="100000"/>
+              </a:lnSpc>
+              <a:buNone/>
+            </a:pPr>
+            <a:r>
+              <a:rPr lang="en-US" b="0" i="1" dirty="0">
+                <a:solidFill>
+                  <a:srgbClr val="242021"/>
+                </a:solidFill>
+                <a:effectLst/>
+                <a:latin typeface="Raleway" pitchFamily="2" charset="0"/>
+                <a:ea typeface="Open Sans Light" panose="020B0306030504020204" pitchFamily="34" charset="0"/>
+                <a:cs typeface="Open Sans Light" panose="020B0306030504020204" pitchFamily="34" charset="0"/>
+              </a:rPr>
+              <a:t>“We computed ln Λ for times up to t = 10</a:t>
+            </a:r>
+            <a:r>
+              <a:rPr lang="en-US" b="0" i="1" baseline="30000" dirty="0">
+                <a:solidFill>
+                  <a:srgbClr val="242021"/>
+                </a:solidFill>
+                <a:effectLst/>
+                <a:latin typeface="Raleway" pitchFamily="2" charset="0"/>
+                <a:ea typeface="Open Sans Light" panose="020B0306030504020204" pitchFamily="34" charset="0"/>
+                <a:cs typeface="Open Sans Light" panose="020B0306030504020204" pitchFamily="34" charset="0"/>
+              </a:rPr>
+              <a:t>6</a:t>
+            </a:r>
+            <a:r>
+              <a:rPr lang="en-US" b="0" i="1" dirty="0">
+                <a:solidFill>
+                  <a:srgbClr val="242021"/>
+                </a:solidFill>
+                <a:effectLst/>
+                <a:latin typeface="Raleway" pitchFamily="2" charset="0"/>
+                <a:ea typeface="Open Sans Light" panose="020B0306030504020204" pitchFamily="34" charset="0"/>
+                <a:cs typeface="Open Sans Light" panose="020B0306030504020204" pitchFamily="34" charset="0"/>
+              </a:rPr>
+              <a:t> kicks with an accuracy of 0.15%. To achieve this accuracy more than</a:t>
+            </a:r>
+            <a:r>
+              <a:rPr lang="en-US" i="1" dirty="0">
+                <a:latin typeface="Raleway" pitchFamily="2" charset="0"/>
+                <a:ea typeface="Open Sans Light" panose="020B0306030504020204" pitchFamily="34" charset="0"/>
+                <a:cs typeface="Open Sans Light" panose="020B0306030504020204" pitchFamily="34" charset="0"/>
+              </a:rPr>
+              <a:t> </a:t>
+            </a:r>
+            <a:r>
+              <a:rPr lang="en-US" b="0" i="1" dirty="0">
+                <a:solidFill>
+                  <a:srgbClr val="242021"/>
+                </a:solidFill>
+                <a:effectLst/>
+                <a:latin typeface="Raleway" pitchFamily="2" charset="0"/>
+                <a:ea typeface="Open Sans Light" panose="020B0306030504020204" pitchFamily="34" charset="0"/>
+                <a:cs typeface="Open Sans Light" panose="020B0306030504020204" pitchFamily="34" charset="0"/>
+              </a:rPr>
+              <a:t>1000 initial conditions are required. To analyze data over the full range of times t ∈ [10</a:t>
+            </a:r>
+            <a:r>
+              <a:rPr lang="en-US" b="0" i="1" baseline="30000" dirty="0">
+                <a:solidFill>
+                  <a:srgbClr val="242021"/>
+                </a:solidFill>
+                <a:effectLst/>
+                <a:latin typeface="Raleway" pitchFamily="2" charset="0"/>
+                <a:ea typeface="Open Sans Light" panose="020B0306030504020204" pitchFamily="34" charset="0"/>
+                <a:cs typeface="Open Sans Light" panose="020B0306030504020204" pitchFamily="34" charset="0"/>
+              </a:rPr>
+              <a:t>3</a:t>
+            </a:r>
+            <a:r>
+              <a:rPr lang="en-US" b="0" i="1" dirty="0">
+                <a:solidFill>
+                  <a:srgbClr val="242021"/>
+                </a:solidFill>
+                <a:effectLst/>
+                <a:latin typeface="Raleway" pitchFamily="2" charset="0"/>
+                <a:ea typeface="Open Sans Light" panose="020B0306030504020204" pitchFamily="34" charset="0"/>
+                <a:cs typeface="Open Sans Light" panose="020B0306030504020204" pitchFamily="34" charset="0"/>
+              </a:rPr>
+              <a:t>,10</a:t>
+            </a:r>
+            <a:r>
+              <a:rPr lang="en-US" b="0" i="1" baseline="30000" dirty="0">
+                <a:solidFill>
+                  <a:srgbClr val="242021"/>
+                </a:solidFill>
+                <a:effectLst/>
+                <a:latin typeface="Raleway" pitchFamily="2" charset="0"/>
+                <a:ea typeface="Open Sans Light" panose="020B0306030504020204" pitchFamily="34" charset="0"/>
+                <a:cs typeface="Open Sans Light" panose="020B0306030504020204" pitchFamily="34" charset="0"/>
+              </a:rPr>
+              <a:t>6</a:t>
+            </a:r>
+            <a:r>
+              <a:rPr lang="en-US" b="0" i="1" dirty="0">
+                <a:solidFill>
+                  <a:srgbClr val="242021"/>
+                </a:solidFill>
+                <a:effectLst/>
+                <a:latin typeface="Raleway" pitchFamily="2" charset="0"/>
+                <a:ea typeface="Open Sans Light" panose="020B0306030504020204" pitchFamily="34" charset="0"/>
+                <a:cs typeface="Open Sans Light" panose="020B0306030504020204" pitchFamily="34" charset="0"/>
+              </a:rPr>
+              <a:t>], we fit the model eq. (12) to the data.”</a:t>
+            </a:r>
+            <a:endParaRPr lang="en-IN" i="1" dirty="0">
+              <a:latin typeface="Raleway" pitchFamily="2" charset="0"/>
+              <a:ea typeface="Open Sans Light" panose="020B0306030504020204" pitchFamily="34" charset="0"/>
+              <a:cs typeface="Open Sans Light" panose="020B0306030504020204" pitchFamily="34" charset="0"/>
+            </a:endParaRPr>
+          </a:p>
+        </p:txBody>
+      </p:sp>
+      <p:sp>
+        <p:nvSpPr>
+          <p:cNvPr id="6" name="TextBox 5">
+            <a:extLst>
+              <a:ext uri="{FF2B5EF4-FFF2-40B4-BE49-F238E27FC236}">
+                <a16:creationId xmlns:a16="http://schemas.microsoft.com/office/drawing/2014/main" id="{DC4FA5C5-0C13-4639-9B6C-FE47867F1296}"/>
+              </a:ext>
+            </a:extLst>
+          </p:cNvPr>
+          <p:cNvSpPr txBox="1"/>
+          <p:nvPr/>
+        </p:nvSpPr>
+        <p:spPr>
+          <a:xfrm>
+            <a:off x="838201" y="4130566"/>
+            <a:ext cx="10515600" cy="954107"/>
+          </a:xfrm>
+          <a:prstGeom prst="rect">
+            <a:avLst/>
+          </a:prstGeom>
+          <a:noFill/>
+        </p:spPr>
+        <p:txBody>
+          <a:bodyPr wrap="square" rtlCol="0">
+            <a:spAutoFit/>
+          </a:bodyPr>
+          <a:lstStyle/>
+          <a:p>
+            <a:r>
+              <a:rPr lang="en-US" sz="2800" b="0" i="0" dirty="0">
+                <a:solidFill>
+                  <a:srgbClr val="000000"/>
+                </a:solidFill>
+                <a:effectLst/>
+                <a:ea typeface="Noto Sans" panose="020B0502040504020204" pitchFamily="34" charset="0"/>
+                <a:cs typeface="Noto Sans" panose="020B0502040504020204" pitchFamily="34" charset="0"/>
+              </a:rPr>
+              <a:t>For context, my run with 1000 timesteps, 201 dimensional space and 100 initial conditions of (</a:t>
+            </a:r>
+            <a:r>
+              <a:rPr lang="en-US" sz="2800" b="0" i="1" dirty="0">
+                <a:solidFill>
+                  <a:srgbClr val="000000"/>
+                </a:solidFill>
+                <a:effectLst/>
+                <a:ea typeface="Noto Sans" panose="020B0502040504020204" pitchFamily="34" charset="0"/>
+                <a:cs typeface="Noto Sans" panose="020B0502040504020204" pitchFamily="34" charset="0"/>
+              </a:rPr>
+              <a:t>φ</a:t>
+            </a:r>
+            <a:r>
+              <a:rPr lang="en-US" sz="2800" b="0" i="0" dirty="0">
+                <a:solidFill>
+                  <a:srgbClr val="000000"/>
+                </a:solidFill>
+                <a:effectLst/>
+                <a:ea typeface="Noto Sans" panose="020B0502040504020204" pitchFamily="34" charset="0"/>
+                <a:cs typeface="Noto Sans" panose="020B0502040504020204" pitchFamily="34" charset="0"/>
+              </a:rPr>
+              <a:t>2</a:t>
+            </a:r>
+            <a:r>
+              <a:rPr lang="en-US" sz="2800" i="1" dirty="0">
+                <a:solidFill>
+                  <a:srgbClr val="000000"/>
+                </a:solidFill>
+                <a:ea typeface="Noto Sans" panose="020B0502040504020204" pitchFamily="34" charset="0"/>
+                <a:cs typeface="Noto Sans" panose="020B0502040504020204" pitchFamily="34" charset="0"/>
+              </a:rPr>
+              <a:t>,</a:t>
+            </a:r>
+            <a:r>
+              <a:rPr lang="en-US" sz="2800" b="0" i="1" dirty="0">
+                <a:solidFill>
+                  <a:srgbClr val="000000"/>
+                </a:solidFill>
+                <a:effectLst/>
+                <a:ea typeface="Noto Sans" panose="020B0502040504020204" pitchFamily="34" charset="0"/>
+                <a:cs typeface="Noto Sans" panose="020B0502040504020204" pitchFamily="34" charset="0"/>
+              </a:rPr>
+              <a:t> φ</a:t>
+            </a:r>
+            <a:r>
+              <a:rPr lang="en-US" sz="2800" b="0" i="0" dirty="0">
+                <a:solidFill>
+                  <a:srgbClr val="000000"/>
+                </a:solidFill>
+                <a:effectLst/>
+                <a:ea typeface="Noto Sans" panose="020B0502040504020204" pitchFamily="34" charset="0"/>
+                <a:cs typeface="Noto Sans" panose="020B0502040504020204" pitchFamily="34" charset="0"/>
+              </a:rPr>
+              <a:t>3) took around 2 hrs.</a:t>
+            </a:r>
+            <a:endParaRPr lang="en-IN" sz="2800" dirty="0">
+              <a:ea typeface="Noto Sans" panose="020B0502040504020204" pitchFamily="34" charset="0"/>
+              <a:cs typeface="Noto Sans" panose="020B0502040504020204" pitchFamily="34" charset="0"/>
+            </a:endParaRPr>
+          </a:p>
+        </p:txBody>
+      </p:sp>
+    </p:spTree>
+    <p:extLst>
+      <p:ext uri="{BB962C8B-B14F-4D97-AF65-F5344CB8AC3E}">
+        <p14:creationId xmlns:p14="http://schemas.microsoft.com/office/powerpoint/2010/main" val="3413139079"/>
+      </p:ext>
+    </p:extLst>
+  </p:cSld>
+  <p:clrMapOvr>
+    <a:masterClrMapping/>
+  </p:clrMapOvr>
+</p:sld>
+</file>
+
 <file path=ppt/slides/slide2.xml><?xml version="1.0" encoding="utf-8"?>
 <p:sld xmlns:a="http://schemas.openxmlformats.org/drawingml/2006/main" xmlns:r="http://schemas.openxmlformats.org/officeDocument/2006/relationships" xmlns:p="http://schemas.openxmlformats.org/presentationml/2006/main">
   <p:cSld>
@@ -3441,7 +3849,7 @@
           <p:cNvPr id="5" name="Content Placeholder 4">
             <a:extLst>
               <a:ext uri="{FF2B5EF4-FFF2-40B4-BE49-F238E27FC236}">
-                <a16:creationId xmlns:a16="http://schemas.microsoft.com/office/drawing/2014/main" id="{3E0D56DE-B72D-474B-972F-B67A3C38581B}"/>
+                <a16:creationId xmlns:a16="http://schemas.microsoft.com/office/drawing/2014/main" id="{AFB174E2-C4A7-4548-9AE7-BC56D88B2A19}"/>
               </a:ext>
             </a:extLst>
           </p:cNvPr>
@@ -3453,22 +3861,28 @@
           </p:nvPr>
         </p:nvPicPr>
         <p:blipFill>
-          <a:blip r:embed="rId2"/>
+          <a:blip r:embed="rId2">
+            <a:extLst>
+              <a:ext uri="{28A0092B-C50C-407E-A947-70E740481C1C}">
+                <a14:useLocalDpi xmlns:a14="http://schemas.microsoft.com/office/drawing/2010/main" val="0"/>
+              </a:ext>
+            </a:extLst>
+          </a:blip>
           <a:stretch>
             <a:fillRect/>
           </a:stretch>
         </p:blipFill>
         <p:spPr>
           <a:xfrm>
-            <a:off x="1663262" y="1065920"/>
-            <a:ext cx="8865476" cy="4726160"/>
+            <a:off x="2325410" y="-10510"/>
+            <a:ext cx="6879020" cy="6879020"/>
           </a:xfrm>
         </p:spPr>
       </p:pic>
     </p:spTree>
     <p:extLst>
       <p:ext uri="{BB962C8B-B14F-4D97-AF65-F5344CB8AC3E}">
-        <p14:creationId xmlns:p14="http://schemas.microsoft.com/office/powerpoint/2010/main" val="4293715060"/>
+        <p14:creationId xmlns:p14="http://schemas.microsoft.com/office/powerpoint/2010/main" val="1799918419"/>
       </p:ext>
     </p:extLst>
   </p:cSld>
@@ -3500,7 +3914,7 @@
           <p:cNvPr id="5" name="Content Placeholder 4">
             <a:extLst>
               <a:ext uri="{FF2B5EF4-FFF2-40B4-BE49-F238E27FC236}">
-                <a16:creationId xmlns:a16="http://schemas.microsoft.com/office/drawing/2014/main" id="{ABCED64F-5B3F-498C-B50B-94615204CB2B}"/>
+                <a16:creationId xmlns:a16="http://schemas.microsoft.com/office/drawing/2014/main" id="{1BE10D23-3ED6-4774-B0A5-1A2438FFC7AE}"/>
               </a:ext>
             </a:extLst>
           </p:cNvPr>
@@ -3512,63 +3926,22 @@
           </p:nvPr>
         </p:nvPicPr>
         <p:blipFill>
-          <a:blip r:embed="rId2">
-            <a:extLst>
-              <a:ext uri="{28A0092B-C50C-407E-A947-70E740481C1C}">
-                <a14:useLocalDpi xmlns:a14="http://schemas.microsoft.com/office/drawing/2010/main" val="0"/>
-              </a:ext>
-            </a:extLst>
-          </a:blip>
+          <a:blip r:embed="rId2"/>
           <a:stretch>
             <a:fillRect/>
           </a:stretch>
         </p:blipFill>
         <p:spPr>
           <a:xfrm>
-            <a:off x="952501" y="0"/>
-            <a:ext cx="10286998" cy="6858000"/>
+            <a:off x="849275" y="1253331"/>
+            <a:ext cx="10493450" cy="4351338"/>
           </a:xfrm>
         </p:spPr>
       </p:pic>
-      <p:sp>
-        <p:nvSpPr>
-          <p:cNvPr id="6" name="TextBox 5">
-            <a:extLst>
-              <a:ext uri="{FF2B5EF4-FFF2-40B4-BE49-F238E27FC236}">
-                <a16:creationId xmlns:a16="http://schemas.microsoft.com/office/drawing/2014/main" id="{6D88FDF0-6D65-4597-AD26-AB6D55900991}"/>
-              </a:ext>
-            </a:extLst>
-          </p:cNvPr>
-          <p:cNvSpPr txBox="1"/>
-          <p:nvPr/>
-        </p:nvSpPr>
-        <p:spPr>
-          <a:xfrm>
-            <a:off x="8269012" y="6156433"/>
-            <a:ext cx="283779" cy="369332"/>
-          </a:xfrm>
-          <a:prstGeom prst="rect">
-            <a:avLst/>
-          </a:prstGeom>
-          <a:noFill/>
-        </p:spPr>
-        <p:txBody>
-          <a:bodyPr wrap="square" rtlCol="0">
-            <a:spAutoFit/>
-          </a:bodyPr>
-          <a:lstStyle/>
-          <a:p>
-            <a:r>
-              <a:rPr lang="en-IN" dirty="0"/>
-              <a:t>t</a:t>
-            </a:r>
-          </a:p>
-        </p:txBody>
-      </p:sp>
     </p:spTree>
     <p:extLst>
       <p:ext uri="{BB962C8B-B14F-4D97-AF65-F5344CB8AC3E}">
-        <p14:creationId xmlns:p14="http://schemas.microsoft.com/office/powerpoint/2010/main" val="908727797"/>
+        <p14:creationId xmlns:p14="http://schemas.microsoft.com/office/powerpoint/2010/main" val="182102908"/>
       </p:ext>
     </p:extLst>
   </p:cSld>
@@ -3597,10 +3970,10 @@
       </p:grpSpPr>
       <p:pic>
         <p:nvPicPr>
-          <p:cNvPr id="5" name="Content Placeholder 4">
-            <a:extLst>
-              <a:ext uri="{FF2B5EF4-FFF2-40B4-BE49-F238E27FC236}">
-                <a16:creationId xmlns:a16="http://schemas.microsoft.com/office/drawing/2014/main" id="{C2DB0489-5137-4B9A-B83B-CD3E09038E38}"/>
+          <p:cNvPr id="9" name="Content Placeholder 8">
+            <a:extLst>
+              <a:ext uri="{FF2B5EF4-FFF2-40B4-BE49-F238E27FC236}">
+                <a16:creationId xmlns:a16="http://schemas.microsoft.com/office/drawing/2014/main" id="{84AA8D57-06EE-40BE-8A27-752DF621AC69}"/>
               </a:ext>
             </a:extLst>
           </p:cNvPr>
@@ -3625,50 +3998,15 @@
         </p:blipFill>
         <p:spPr>
           <a:xfrm>
-            <a:off x="959069" y="4378"/>
-            <a:ext cx="10273862" cy="6849244"/>
+            <a:off x="1524002" y="0"/>
+            <a:ext cx="9143996" cy="6858000"/>
           </a:xfrm>
         </p:spPr>
       </p:pic>
-      <p:sp>
-        <p:nvSpPr>
-          <p:cNvPr id="6" name="TextBox 5">
-            <a:extLst>
-              <a:ext uri="{FF2B5EF4-FFF2-40B4-BE49-F238E27FC236}">
-                <a16:creationId xmlns:a16="http://schemas.microsoft.com/office/drawing/2014/main" id="{C1F3E99D-7CCB-4CC7-AB4C-7A1EAF13683B}"/>
-              </a:ext>
-            </a:extLst>
-          </p:cNvPr>
-          <p:cNvSpPr txBox="1"/>
-          <p:nvPr/>
-        </p:nvSpPr>
-        <p:spPr>
-          <a:xfrm>
-            <a:off x="8269012" y="6156433"/>
-            <a:ext cx="283779" cy="369332"/>
-          </a:xfrm>
-          <a:prstGeom prst="rect">
-            <a:avLst/>
-          </a:prstGeom>
-          <a:noFill/>
-        </p:spPr>
-        <p:txBody>
-          <a:bodyPr wrap="square" rtlCol="0">
-            <a:spAutoFit/>
-          </a:bodyPr>
-          <a:lstStyle/>
-          <a:p>
-            <a:r>
-              <a:rPr lang="en-IN" dirty="0"/>
-              <a:t>t</a:t>
-            </a:r>
-          </a:p>
-        </p:txBody>
-      </p:sp>
     </p:spTree>
     <p:extLst>
       <p:ext uri="{BB962C8B-B14F-4D97-AF65-F5344CB8AC3E}">
-        <p14:creationId xmlns:p14="http://schemas.microsoft.com/office/powerpoint/2010/main" val="462276352"/>
+        <p14:creationId xmlns:p14="http://schemas.microsoft.com/office/powerpoint/2010/main" val="2535623161"/>
       </p:ext>
     </p:extLst>
   </p:cSld>
@@ -3700,7 +4038,7 @@
           <p:cNvPr id="5" name="Content Placeholder 4">
             <a:extLst>
               <a:ext uri="{FF2B5EF4-FFF2-40B4-BE49-F238E27FC236}">
-                <a16:creationId xmlns:a16="http://schemas.microsoft.com/office/drawing/2014/main" id="{1211E452-6756-4103-8F59-2AEC0BC64A2B}"/>
+                <a16:creationId xmlns:a16="http://schemas.microsoft.com/office/drawing/2014/main" id="{3E0D56DE-B72D-474B-972F-B67A3C38581B}"/>
               </a:ext>
             </a:extLst>
           </p:cNvPr>
@@ -3719,15 +4057,15 @@
         </p:blipFill>
         <p:spPr>
           <a:xfrm>
-            <a:off x="2137692" y="0"/>
-            <a:ext cx="7916616" cy="6858000"/>
+            <a:off x="1663262" y="1065920"/>
+            <a:ext cx="8865476" cy="4726160"/>
           </a:xfrm>
         </p:spPr>
       </p:pic>
     </p:spTree>
     <p:extLst>
       <p:ext uri="{BB962C8B-B14F-4D97-AF65-F5344CB8AC3E}">
-        <p14:creationId xmlns:p14="http://schemas.microsoft.com/office/powerpoint/2010/main" val="1340063237"/>
+        <p14:creationId xmlns:p14="http://schemas.microsoft.com/office/powerpoint/2010/main" val="4293715060"/>
       </p:ext>
     </p:extLst>
   </p:cSld>
@@ -3759,7 +4097,7 @@
           <p:cNvPr id="5" name="Content Placeholder 4">
             <a:extLst>
               <a:ext uri="{FF2B5EF4-FFF2-40B4-BE49-F238E27FC236}">
-                <a16:creationId xmlns:a16="http://schemas.microsoft.com/office/drawing/2014/main" id="{D4906A0D-46F2-4911-AE06-9AE211257BBC}"/>
+                <a16:creationId xmlns:a16="http://schemas.microsoft.com/office/drawing/2014/main" id="{ABCED64F-5B3F-498C-B50B-94615204CB2B}"/>
               </a:ext>
             </a:extLst>
           </p:cNvPr>
@@ -3784,15 +4122,50 @@
         </p:blipFill>
         <p:spPr>
           <a:xfrm>
-            <a:off x="-5256" y="1395249"/>
-            <a:ext cx="12202512" cy="4067502"/>
+            <a:off x="952501" y="0"/>
+            <a:ext cx="10286998" cy="6858000"/>
           </a:xfrm>
         </p:spPr>
       </p:pic>
+      <p:sp>
+        <p:nvSpPr>
+          <p:cNvPr id="6" name="TextBox 5">
+            <a:extLst>
+              <a:ext uri="{FF2B5EF4-FFF2-40B4-BE49-F238E27FC236}">
+                <a16:creationId xmlns:a16="http://schemas.microsoft.com/office/drawing/2014/main" id="{6D88FDF0-6D65-4597-AD26-AB6D55900991}"/>
+              </a:ext>
+            </a:extLst>
+          </p:cNvPr>
+          <p:cNvSpPr txBox="1"/>
+          <p:nvPr/>
+        </p:nvSpPr>
+        <p:spPr>
+          <a:xfrm>
+            <a:off x="8269012" y="6156433"/>
+            <a:ext cx="283779" cy="369332"/>
+          </a:xfrm>
+          <a:prstGeom prst="rect">
+            <a:avLst/>
+          </a:prstGeom>
+          <a:noFill/>
+        </p:spPr>
+        <p:txBody>
+          <a:bodyPr wrap="square" rtlCol="0">
+            <a:spAutoFit/>
+          </a:bodyPr>
+          <a:lstStyle/>
+          <a:p>
+            <a:r>
+              <a:rPr lang="en-IN" dirty="0"/>
+              <a:t>t</a:t>
+            </a:r>
+          </a:p>
+        </p:txBody>
+      </p:sp>
     </p:spTree>
     <p:extLst>
       <p:ext uri="{BB962C8B-B14F-4D97-AF65-F5344CB8AC3E}">
-        <p14:creationId xmlns:p14="http://schemas.microsoft.com/office/powerpoint/2010/main" val="1984406353"/>
+        <p14:creationId xmlns:p14="http://schemas.microsoft.com/office/powerpoint/2010/main" val="908727797"/>
       </p:ext>
     </p:extLst>
   </p:cSld>
@@ -3824,7 +4197,7 @@
           <p:cNvPr id="5" name="Content Placeholder 4">
             <a:extLst>
               <a:ext uri="{FF2B5EF4-FFF2-40B4-BE49-F238E27FC236}">
-                <a16:creationId xmlns:a16="http://schemas.microsoft.com/office/drawing/2014/main" id="{18E678D0-E5DC-4DB2-B16C-C46FA933E352}"/>
+                <a16:creationId xmlns:a16="http://schemas.microsoft.com/office/drawing/2014/main" id="{C2DB0489-5137-4B9A-B83B-CD3E09038E38}"/>
               </a:ext>
             </a:extLst>
           </p:cNvPr>
@@ -3849,15 +4222,50 @@
         </p:blipFill>
         <p:spPr>
           <a:xfrm>
-            <a:off x="-5256" y="1395249"/>
-            <a:ext cx="12202512" cy="4067502"/>
+            <a:off x="959069" y="4378"/>
+            <a:ext cx="10273862" cy="6849244"/>
           </a:xfrm>
         </p:spPr>
       </p:pic>
+      <p:sp>
+        <p:nvSpPr>
+          <p:cNvPr id="6" name="TextBox 5">
+            <a:extLst>
+              <a:ext uri="{FF2B5EF4-FFF2-40B4-BE49-F238E27FC236}">
+                <a16:creationId xmlns:a16="http://schemas.microsoft.com/office/drawing/2014/main" id="{C1F3E99D-7CCB-4CC7-AB4C-7A1EAF13683B}"/>
+              </a:ext>
+            </a:extLst>
+          </p:cNvPr>
+          <p:cNvSpPr txBox="1"/>
+          <p:nvPr/>
+        </p:nvSpPr>
+        <p:spPr>
+          <a:xfrm>
+            <a:off x="8269012" y="6156433"/>
+            <a:ext cx="283779" cy="369332"/>
+          </a:xfrm>
+          <a:prstGeom prst="rect">
+            <a:avLst/>
+          </a:prstGeom>
+          <a:noFill/>
+        </p:spPr>
+        <p:txBody>
+          <a:bodyPr wrap="square" rtlCol="0">
+            <a:spAutoFit/>
+          </a:bodyPr>
+          <a:lstStyle/>
+          <a:p>
+            <a:r>
+              <a:rPr lang="en-IN" dirty="0"/>
+              <a:t>t</a:t>
+            </a:r>
+          </a:p>
+        </p:txBody>
+      </p:sp>
     </p:spTree>
     <p:extLst>
       <p:ext uri="{BB962C8B-B14F-4D97-AF65-F5344CB8AC3E}">
-        <p14:creationId xmlns:p14="http://schemas.microsoft.com/office/powerpoint/2010/main" val="2682917440"/>
+        <p14:creationId xmlns:p14="http://schemas.microsoft.com/office/powerpoint/2010/main" val="462276352"/>
       </p:ext>
     </p:extLst>
   </p:cSld>
@@ -3889,7 +4297,7 @@
           <p:cNvPr id="5" name="Content Placeholder 4">
             <a:extLst>
               <a:ext uri="{FF2B5EF4-FFF2-40B4-BE49-F238E27FC236}">
-                <a16:creationId xmlns:a16="http://schemas.microsoft.com/office/drawing/2014/main" id="{2C6E9B32-584A-4A8A-B134-193B209761A7}"/>
+                <a16:creationId xmlns:a16="http://schemas.microsoft.com/office/drawing/2014/main" id="{1211E452-6756-4103-8F59-2AEC0BC64A2B}"/>
               </a:ext>
             </a:extLst>
           </p:cNvPr>
@@ -3908,15 +4316,15 @@
         </p:blipFill>
         <p:spPr>
           <a:xfrm>
-            <a:off x="2080506" y="0"/>
-            <a:ext cx="8172878" cy="6858000"/>
+            <a:off x="2137692" y="0"/>
+            <a:ext cx="7916616" cy="6858000"/>
           </a:xfrm>
         </p:spPr>
       </p:pic>
     </p:spTree>
     <p:extLst>
       <p:ext uri="{BB962C8B-B14F-4D97-AF65-F5344CB8AC3E}">
-        <p14:creationId xmlns:p14="http://schemas.microsoft.com/office/powerpoint/2010/main" val="1440578533"/>
+        <p14:creationId xmlns:p14="http://schemas.microsoft.com/office/powerpoint/2010/main" val="1340063237"/>
       </p:ext>
     </p:extLst>
   </p:cSld>
@@ -3943,256 +4351,45 @@
           <a:chExt cx="0" cy="0"/>
         </a:xfrm>
       </p:grpSpPr>
-      <p:sp>
-        <p:nvSpPr>
-          <p:cNvPr id="3" name="Content Placeholder 2">
-            <a:extLst>
-              <a:ext uri="{FF2B5EF4-FFF2-40B4-BE49-F238E27FC236}">
-                <a16:creationId xmlns:a16="http://schemas.microsoft.com/office/drawing/2014/main" id="{7BF75504-C229-4E31-A956-5FE1963E1457}"/>
-              </a:ext>
-            </a:extLst>
-          </p:cNvPr>
-          <p:cNvSpPr>
-            <a:spLocks noGrp="1"/>
-          </p:cNvSpPr>
+      <p:pic>
+        <p:nvPicPr>
+          <p:cNvPr id="5" name="Content Placeholder 4">
+            <a:extLst>
+              <a:ext uri="{FF2B5EF4-FFF2-40B4-BE49-F238E27FC236}">
+                <a16:creationId xmlns:a16="http://schemas.microsoft.com/office/drawing/2014/main" id="{D4906A0D-46F2-4911-AE06-9AE211257BBC}"/>
+              </a:ext>
+            </a:extLst>
+          </p:cNvPr>
+          <p:cNvPicPr>
+            <a:picLocks noGrp="1" noChangeAspect="1"/>
+          </p:cNvPicPr>
           <p:nvPr>
             <p:ph idx="1"/>
           </p:nvPr>
-        </p:nvSpPr>
+        </p:nvPicPr>
+        <p:blipFill>
+          <a:blip r:embed="rId2">
+            <a:extLst>
+              <a:ext uri="{28A0092B-C50C-407E-A947-70E740481C1C}">
+                <a14:useLocalDpi xmlns:a14="http://schemas.microsoft.com/office/drawing/2010/main" val="0"/>
+              </a:ext>
+            </a:extLst>
+          </a:blip>
+          <a:stretch>
+            <a:fillRect/>
+          </a:stretch>
+        </p:blipFill>
         <p:spPr>
           <a:xfrm>
-            <a:off x="838200" y="1825625"/>
-            <a:ext cx="10515600" cy="1981747"/>
+            <a:off x="-5256" y="1395249"/>
+            <a:ext cx="12202512" cy="4067502"/>
           </a:xfrm>
         </p:spPr>
-        <p:txBody>
-          <a:bodyPr>
-            <a:normAutofit/>
-          </a:bodyPr>
-          <a:lstStyle/>
-          <a:p>
-            <a:pPr marL="0" indent="0">
-              <a:lnSpc>
-                <a:spcPct val="100000"/>
-              </a:lnSpc>
-              <a:buNone/>
-            </a:pPr>
-            <a:r>
-              <a:rPr lang="en-US" b="0" i="1" dirty="0">
-                <a:solidFill>
-                  <a:srgbClr val="242021"/>
-                </a:solidFill>
-                <a:effectLst/>
-                <a:latin typeface="Raleway" pitchFamily="2" charset="0"/>
-                <a:ea typeface="Open Sans Light" panose="020B0306030504020204" pitchFamily="34" charset="0"/>
-                <a:cs typeface="Open Sans Light" panose="020B0306030504020204" pitchFamily="34" charset="0"/>
-              </a:rPr>
-              <a:t>“We computed ln Λ for times up to t = 10</a:t>
-            </a:r>
-            <a:r>
-              <a:rPr lang="en-US" b="0" i="1" baseline="30000" dirty="0">
-                <a:solidFill>
-                  <a:srgbClr val="242021"/>
-                </a:solidFill>
-                <a:effectLst/>
-                <a:latin typeface="Raleway" pitchFamily="2" charset="0"/>
-                <a:ea typeface="Open Sans Light" panose="020B0306030504020204" pitchFamily="34" charset="0"/>
-                <a:cs typeface="Open Sans Light" panose="020B0306030504020204" pitchFamily="34" charset="0"/>
-              </a:rPr>
-              <a:t>6</a:t>
-            </a:r>
-            <a:r>
-              <a:rPr lang="en-US" b="0" i="1" dirty="0">
-                <a:solidFill>
-                  <a:srgbClr val="242021"/>
-                </a:solidFill>
-                <a:effectLst/>
-                <a:latin typeface="Raleway" pitchFamily="2" charset="0"/>
-                <a:ea typeface="Open Sans Light" panose="020B0306030504020204" pitchFamily="34" charset="0"/>
-                <a:cs typeface="Open Sans Light" panose="020B0306030504020204" pitchFamily="34" charset="0"/>
-              </a:rPr>
-              <a:t> kicks with an accuracy of 0.15%. To achieve this accuracy more than</a:t>
-            </a:r>
-            <a:r>
-              <a:rPr lang="en-US" i="1" dirty="0">
-                <a:latin typeface="Raleway" pitchFamily="2" charset="0"/>
-                <a:ea typeface="Open Sans Light" panose="020B0306030504020204" pitchFamily="34" charset="0"/>
-                <a:cs typeface="Open Sans Light" panose="020B0306030504020204" pitchFamily="34" charset="0"/>
-              </a:rPr>
-              <a:t> </a:t>
-            </a:r>
-            <a:r>
-              <a:rPr lang="en-US" b="0" i="1" dirty="0">
-                <a:solidFill>
-                  <a:srgbClr val="242021"/>
-                </a:solidFill>
-                <a:effectLst/>
-                <a:latin typeface="Raleway" pitchFamily="2" charset="0"/>
-                <a:ea typeface="Open Sans Light" panose="020B0306030504020204" pitchFamily="34" charset="0"/>
-                <a:cs typeface="Open Sans Light" panose="020B0306030504020204" pitchFamily="34" charset="0"/>
-              </a:rPr>
-              <a:t>1000 initial conditions are required. To analyze data over the full range of times t ∈ [10</a:t>
-            </a:r>
-            <a:r>
-              <a:rPr lang="en-US" b="0" i="1" baseline="30000" dirty="0">
-                <a:solidFill>
-                  <a:srgbClr val="242021"/>
-                </a:solidFill>
-                <a:effectLst/>
-                <a:latin typeface="Raleway" pitchFamily="2" charset="0"/>
-                <a:ea typeface="Open Sans Light" panose="020B0306030504020204" pitchFamily="34" charset="0"/>
-                <a:cs typeface="Open Sans Light" panose="020B0306030504020204" pitchFamily="34" charset="0"/>
-              </a:rPr>
-              <a:t>3</a:t>
-            </a:r>
-            <a:r>
-              <a:rPr lang="en-US" b="0" i="1" dirty="0">
-                <a:solidFill>
-                  <a:srgbClr val="242021"/>
-                </a:solidFill>
-                <a:effectLst/>
-                <a:latin typeface="Raleway" pitchFamily="2" charset="0"/>
-                <a:ea typeface="Open Sans Light" panose="020B0306030504020204" pitchFamily="34" charset="0"/>
-                <a:cs typeface="Open Sans Light" panose="020B0306030504020204" pitchFamily="34" charset="0"/>
-              </a:rPr>
-              <a:t>,10</a:t>
-            </a:r>
-            <a:r>
-              <a:rPr lang="en-US" b="0" i="1" baseline="30000" dirty="0">
-                <a:solidFill>
-                  <a:srgbClr val="242021"/>
-                </a:solidFill>
-                <a:effectLst/>
-                <a:latin typeface="Raleway" pitchFamily="2" charset="0"/>
-                <a:ea typeface="Open Sans Light" panose="020B0306030504020204" pitchFamily="34" charset="0"/>
-                <a:cs typeface="Open Sans Light" panose="020B0306030504020204" pitchFamily="34" charset="0"/>
-              </a:rPr>
-              <a:t>6</a:t>
-            </a:r>
-            <a:r>
-              <a:rPr lang="en-US" b="0" i="1" dirty="0">
-                <a:solidFill>
-                  <a:srgbClr val="242021"/>
-                </a:solidFill>
-                <a:effectLst/>
-                <a:latin typeface="Raleway" pitchFamily="2" charset="0"/>
-                <a:ea typeface="Open Sans Light" panose="020B0306030504020204" pitchFamily="34" charset="0"/>
-                <a:cs typeface="Open Sans Light" panose="020B0306030504020204" pitchFamily="34" charset="0"/>
-              </a:rPr>
-              <a:t>], we fit the model eq. (12) to the data.”</a:t>
-            </a:r>
-            <a:endParaRPr lang="en-IN" i="1" dirty="0">
-              <a:latin typeface="Raleway" pitchFamily="2" charset="0"/>
-              <a:ea typeface="Open Sans Light" panose="020B0306030504020204" pitchFamily="34" charset="0"/>
-              <a:cs typeface="Open Sans Light" panose="020B0306030504020204" pitchFamily="34" charset="0"/>
-            </a:endParaRPr>
-          </a:p>
-        </p:txBody>
-      </p:sp>
-      <p:sp>
-        <p:nvSpPr>
-          <p:cNvPr id="6" name="TextBox 5">
-            <a:extLst>
-              <a:ext uri="{FF2B5EF4-FFF2-40B4-BE49-F238E27FC236}">
-                <a16:creationId xmlns:a16="http://schemas.microsoft.com/office/drawing/2014/main" id="{DC4FA5C5-0C13-4639-9B6C-FE47867F1296}"/>
-              </a:ext>
-            </a:extLst>
-          </p:cNvPr>
-          <p:cNvSpPr txBox="1"/>
-          <p:nvPr/>
-        </p:nvSpPr>
-        <p:spPr>
-          <a:xfrm>
-            <a:off x="838201" y="4130566"/>
-            <a:ext cx="10515600" cy="954107"/>
-          </a:xfrm>
-          <a:prstGeom prst="rect">
-            <a:avLst/>
-          </a:prstGeom>
-          <a:noFill/>
-        </p:spPr>
-        <p:txBody>
-          <a:bodyPr wrap="square" rtlCol="0">
-            <a:spAutoFit/>
-          </a:bodyPr>
-          <a:lstStyle/>
-          <a:p>
-            <a:r>
-              <a:rPr lang="en-US" sz="2800" b="0" i="0" dirty="0">
-                <a:solidFill>
-                  <a:srgbClr val="000000"/>
-                </a:solidFill>
-                <a:effectLst/>
-                <a:ea typeface="Noto Sans" panose="020B0502040504020204" pitchFamily="34" charset="0"/>
-                <a:cs typeface="Noto Sans" panose="020B0502040504020204" pitchFamily="34" charset="0"/>
-              </a:rPr>
-              <a:t>For context, my run with 1000 timesteps, 201 dimensional space and 100 initial conditions of (</a:t>
-            </a:r>
-            <a:r>
-              <a:rPr lang="en-US" sz="2800" b="0" i="1" dirty="0">
-                <a:solidFill>
-                  <a:srgbClr val="000000"/>
-                </a:solidFill>
-                <a:effectLst/>
-                <a:ea typeface="Noto Sans" panose="020B0502040504020204" pitchFamily="34" charset="0"/>
-                <a:cs typeface="Noto Sans" panose="020B0502040504020204" pitchFamily="34" charset="0"/>
-              </a:rPr>
-              <a:t>φ</a:t>
-            </a:r>
-            <a:r>
-              <a:rPr lang="en-US" sz="2800" b="0" i="0" dirty="0">
-                <a:solidFill>
-                  <a:srgbClr val="000000"/>
-                </a:solidFill>
-                <a:effectLst/>
-                <a:ea typeface="Noto Sans" panose="020B0502040504020204" pitchFamily="34" charset="0"/>
-                <a:cs typeface="Noto Sans" panose="020B0502040504020204" pitchFamily="34" charset="0"/>
-              </a:rPr>
-              <a:t>2</a:t>
-            </a:r>
-            <a:r>
-              <a:rPr lang="en-US" sz="2800" i="1" dirty="0">
-                <a:solidFill>
-                  <a:srgbClr val="000000"/>
-                </a:solidFill>
-                <a:ea typeface="Noto Sans" panose="020B0502040504020204" pitchFamily="34" charset="0"/>
-                <a:cs typeface="Noto Sans" panose="020B0502040504020204" pitchFamily="34" charset="0"/>
-              </a:rPr>
-              <a:t>,</a:t>
-            </a:r>
-            <a:r>
-              <a:rPr lang="en-US" sz="2800" b="0" i="1" dirty="0">
-                <a:solidFill>
-                  <a:srgbClr val="000000"/>
-                </a:solidFill>
-                <a:effectLst/>
-                <a:ea typeface="Noto Sans" panose="020B0502040504020204" pitchFamily="34" charset="0"/>
-                <a:cs typeface="Noto Sans" panose="020B0502040504020204" pitchFamily="34" charset="0"/>
-              </a:rPr>
-              <a:t> φ</a:t>
-            </a:r>
-            <a:r>
-              <a:rPr lang="en-US" sz="2800" b="0" i="0" dirty="0">
-                <a:solidFill>
-                  <a:srgbClr val="000000"/>
-                </a:solidFill>
-                <a:effectLst/>
-                <a:ea typeface="Noto Sans" panose="020B0502040504020204" pitchFamily="34" charset="0"/>
-                <a:cs typeface="Noto Sans" panose="020B0502040504020204" pitchFamily="34" charset="0"/>
-              </a:rPr>
-              <a:t>3) took around 2 hrs.</a:t>
-            </a:r>
-            <a:endParaRPr lang="en-IN" sz="2800" dirty="0">
-              <a:ea typeface="Noto Sans" panose="020B0502040504020204" pitchFamily="34" charset="0"/>
-              <a:cs typeface="Noto Sans" panose="020B0502040504020204" pitchFamily="34" charset="0"/>
-            </a:endParaRPr>
-          </a:p>
-        </p:txBody>
-      </p:sp>
+      </p:pic>
     </p:spTree>
     <p:extLst>
       <p:ext uri="{BB962C8B-B14F-4D97-AF65-F5344CB8AC3E}">
-        <p14:creationId xmlns:p14="http://schemas.microsoft.com/office/powerpoint/2010/main" val="3413139079"/>
+        <p14:creationId xmlns:p14="http://schemas.microsoft.com/office/powerpoint/2010/main" val="1984406353"/>
       </p:ext>
     </p:extLst>
   </p:cSld>

</xml_diff>